<commit_message>
Correction of paths, with backslashes and ?raw=true for pickelised model
</commit_message>
<xml_diff>
--- a/soutenance/P7_soutenance.pptx
+++ b/soutenance/P7_soutenance.pptx
@@ -23879,7 +23879,7 @@
                 <a:latin typeface="Arial" panose="020B0604020202020204" pitchFamily="34" charset="0"/>
                 <a:cs typeface="Arial" panose="020B0604020202020204" pitchFamily="34" charset="0"/>
               </a:rPr>
-              <a:t>dashboard.py</a:t>
+              <a:t>app.py</a:t>
             </a:r>
           </a:p>
         </p:txBody>
@@ -24070,10 +24070,10 @@
       </p:grpSpPr>
       <p:pic>
         <p:nvPicPr>
-          <p:cNvPr id="18" name="Image 17">
-            <a:extLst>
-              <a:ext uri="{FF2B5EF4-FFF2-40B4-BE49-F238E27FC236}">
-                <a16:creationId xmlns:a16="http://schemas.microsoft.com/office/drawing/2014/main" id="{11B25C58-037B-457A-8E9B-ADC17E8E77EB}"/>
+          <p:cNvPr id="7" name="Image 6">
+            <a:extLst>
+              <a:ext uri="{FF2B5EF4-FFF2-40B4-BE49-F238E27FC236}">
+                <a16:creationId xmlns:a16="http://schemas.microsoft.com/office/drawing/2014/main" id="{26EAE7C4-2018-449E-81E6-D7DCA4A1C0B4}"/>
               </a:ext>
             </a:extLst>
           </p:cNvPr>
@@ -24105,19 +24105,12 @@
         </p:blipFill>
         <p:spPr>
           <a:xfrm>
-            <a:off x="237657" y="2054592"/>
-            <a:ext cx="3264250" cy="3917099"/>
+            <a:off x="295833" y="2054592"/>
+            <a:ext cx="2987618" cy="3917099"/>
           </a:xfrm>
           <a:prstGeom prst="rect">
             <a:avLst/>
           </a:prstGeom>
-          <a:effectLst>
-            <a:outerShdw blurRad="50800" dist="38100" dir="2700000" algn="tl" rotWithShape="0">
-              <a:prstClr val="black">
-                <a:alpha val="40000"/>
-              </a:prstClr>
-            </a:outerShdw>
-          </a:effectLst>
         </p:spPr>
       </p:pic>
       <p:sp>
@@ -24335,8 +24328,8 @@
         </p:nvCxnSpPr>
         <p:spPr>
           <a:xfrm flipH="1">
-            <a:off x="2218267" y="2751307"/>
-            <a:ext cx="2421466" cy="353668"/>
+            <a:off x="2229088" y="2751307"/>
+            <a:ext cx="2410645" cy="590905"/>
           </a:xfrm>
           <a:prstGeom prst="straightConnector1">
             <a:avLst/>
@@ -24429,8 +24422,8 @@
         </p:nvCxnSpPr>
         <p:spPr>
           <a:xfrm flipH="1">
-            <a:off x="2282189" y="3211837"/>
-            <a:ext cx="2357544" cy="93490"/>
+            <a:off x="2293010" y="3211837"/>
+            <a:ext cx="2346723" cy="330727"/>
           </a:xfrm>
           <a:prstGeom prst="straightConnector1">
             <a:avLst/>
@@ -24567,9 +24560,9 @@
           <p:nvPr/>
         </p:nvCxnSpPr>
         <p:spPr>
-          <a:xfrm flipH="1" flipV="1">
-            <a:off x="3241084" y="3488172"/>
-            <a:ext cx="1398649" cy="184195"/>
+          <a:xfrm flipH="1">
+            <a:off x="3251905" y="3672367"/>
+            <a:ext cx="1387828" cy="53042"/>
           </a:xfrm>
           <a:prstGeom prst="straightConnector1">
             <a:avLst/>
@@ -24662,8 +24655,8 @@
         </p:nvCxnSpPr>
         <p:spPr>
           <a:xfrm flipH="1" flipV="1">
-            <a:off x="2218267" y="3681953"/>
-            <a:ext cx="2421466" cy="666386"/>
+            <a:off x="2229088" y="3919190"/>
+            <a:ext cx="2410645" cy="429149"/>
           </a:xfrm>
           <a:prstGeom prst="straightConnector1">
             <a:avLst/>
@@ -24707,7 +24700,7 @@
         </p:nvSpPr>
         <p:spPr>
           <a:xfrm>
-            <a:off x="4639733" y="5330338"/>
+            <a:off x="4691665" y="5438552"/>
             <a:ext cx="4373313" cy="307777"/>
           </a:xfrm>
           <a:prstGeom prst="rect">
@@ -24763,8 +24756,8 @@
         </p:nvCxnSpPr>
         <p:spPr>
           <a:xfrm flipH="1" flipV="1">
-            <a:off x="2714625" y="5017922"/>
-            <a:ext cx="1925108" cy="466305"/>
+            <a:off x="2612961" y="5109797"/>
+            <a:ext cx="2078704" cy="482644"/>
           </a:xfrm>
           <a:prstGeom prst="straightConnector1">
             <a:avLst/>
@@ -24808,7 +24801,7 @@
         </p:nvSpPr>
         <p:spPr>
           <a:xfrm>
-            <a:off x="857955" y="3004128"/>
+            <a:off x="868776" y="3241365"/>
             <a:ext cx="1360312" cy="201693"/>
           </a:xfrm>
           <a:prstGeom prst="ellipse">
@@ -24912,7 +24905,7 @@
         </p:nvSpPr>
         <p:spPr>
           <a:xfrm>
-            <a:off x="819618" y="3204480"/>
+            <a:off x="830439" y="3441717"/>
             <a:ext cx="1462571" cy="201693"/>
           </a:xfrm>
           <a:prstGeom prst="ellipse">
@@ -24964,7 +24957,7 @@
         </p:nvSpPr>
         <p:spPr>
           <a:xfrm>
-            <a:off x="819618" y="3387325"/>
+            <a:off x="830439" y="3624562"/>
             <a:ext cx="2421466" cy="201693"/>
           </a:xfrm>
           <a:prstGeom prst="ellipse">
@@ -25016,7 +25009,7 @@
         </p:nvSpPr>
         <p:spPr>
           <a:xfrm>
-            <a:off x="819618" y="3581106"/>
+            <a:off x="830439" y="3818343"/>
             <a:ext cx="1398649" cy="201693"/>
           </a:xfrm>
           <a:prstGeom prst="ellipse">
@@ -25068,7 +25061,7 @@
         </p:nvSpPr>
         <p:spPr>
           <a:xfrm>
-            <a:off x="819618" y="4709259"/>
+            <a:off x="751778" y="4793084"/>
             <a:ext cx="1704405" cy="201693"/>
           </a:xfrm>
           <a:prstGeom prst="ellipse">
@@ -25120,7 +25113,7 @@
         </p:nvSpPr>
         <p:spPr>
           <a:xfrm>
-            <a:off x="819618" y="4916672"/>
+            <a:off x="751778" y="5000497"/>
             <a:ext cx="1704405" cy="201693"/>
           </a:xfrm>
           <a:prstGeom prst="ellipse">
@@ -25172,7 +25165,7 @@
         </p:nvSpPr>
         <p:spPr>
           <a:xfrm>
-            <a:off x="819618" y="5101988"/>
+            <a:off x="751778" y="5185813"/>
             <a:ext cx="1754249" cy="201693"/>
           </a:xfrm>
           <a:prstGeom prst="ellipse">
@@ -25224,7 +25217,7 @@
         </p:nvSpPr>
         <p:spPr>
           <a:xfrm>
-            <a:off x="2575560" y="4728362"/>
+            <a:off x="2473896" y="4820237"/>
             <a:ext cx="139093" cy="577215"/>
           </a:xfrm>
           <a:custGeom>
@@ -25621,6 +25614,59 @@
           </a:p>
         </p:txBody>
       </p:sp>
+      <p:sp>
+        <p:nvSpPr>
+          <p:cNvPr id="35" name="ZoneTexte 34">
+            <a:extLst>
+              <a:ext uri="{FF2B5EF4-FFF2-40B4-BE49-F238E27FC236}">
+                <a16:creationId xmlns:a16="http://schemas.microsoft.com/office/drawing/2014/main" id="{1BD43DB8-BB05-49F1-AB3D-194E57DBD9DE}"/>
+              </a:ext>
+            </a:extLst>
+          </p:cNvPr>
+          <p:cNvSpPr txBox="1"/>
+          <p:nvPr/>
+        </p:nvSpPr>
+        <p:spPr>
+          <a:xfrm>
+            <a:off x="305760" y="5960636"/>
+            <a:ext cx="2646284" cy="307777"/>
+          </a:xfrm>
+          <a:prstGeom prst="rect">
+            <a:avLst/>
+          </a:prstGeom>
+          <a:noFill/>
+        </p:spPr>
+        <p:txBody>
+          <a:bodyPr wrap="square" rtlCol="0">
+            <a:spAutoFit/>
+          </a:bodyPr>
+          <a:lstStyle/>
+          <a:p>
+            <a:pPr algn="ctr"/>
+            <a:r>
+              <a:rPr lang="fr-FR" sz="1400" dirty="0">
+                <a:latin typeface="Arial" panose="020B0604020202020204" pitchFamily="34" charset="0"/>
+                <a:cs typeface="Arial" panose="020B0604020202020204" pitchFamily="34" charset="0"/>
+              </a:rPr>
+              <a:t>Command line : </a:t>
+            </a:r>
+            <a:r>
+              <a:rPr lang="fr-FR" sz="1400" dirty="0" err="1">
+                <a:latin typeface="Arial" panose="020B0604020202020204" pitchFamily="34" charset="0"/>
+                <a:cs typeface="Arial" panose="020B0604020202020204" pitchFamily="34" charset="0"/>
+              </a:rPr>
+              <a:t>tree</a:t>
+            </a:r>
+            <a:r>
+              <a:rPr lang="fr-FR" sz="1400" dirty="0">
+                <a:latin typeface="Arial" panose="020B0604020202020204" pitchFamily="34" charset="0"/>
+                <a:cs typeface="Arial" panose="020B0604020202020204" pitchFamily="34" charset="0"/>
+              </a:rPr>
+              <a:t> /f</a:t>
+            </a:r>
+          </a:p>
+        </p:txBody>
+      </p:sp>
     </p:spTree>
     <p:extLst>
       <p:ext uri="{BB962C8B-B14F-4D97-AF65-F5344CB8AC3E}">
@@ -25947,7 +25993,7 @@
                 <a:latin typeface="Arial" panose="020B0604020202020204" pitchFamily="34" charset="0"/>
                 <a:cs typeface="Arial" panose="020B0604020202020204" pitchFamily="34" charset="0"/>
               </a:rPr>
-              <a:t>dashboard.py</a:t>
+              <a:t>app.py</a:t>
             </a:r>
           </a:p>
           <a:p>

</xml_diff>